<commit_message>
Updated Slides Lec 12
</commit_message>
<xml_diff>
--- a/Syllabus/Lecture07/Lec07.pptx
+++ b/Syllabus/Lecture07/Lec07.pptx
@@ -289,7 +289,7 @@
           <a:p>
             <a:fld id="{DF9C6931-D0F6-AB40-9D7F-95567148A5C2}" type="datetimeFigureOut">
               <a:rPr lang="en-US" smtClean="0"/>
-              <a:t>10/4/22</a:t>
+              <a:t>10/5/22</a:t>
             </a:fld>
             <a:endParaRPr lang="en-US"/>
           </a:p>
@@ -638,7 +638,7 @@
           <a:p>
             <a:fld id="{736C18F2-6801-5147-A332-A6E1C7D69D18}" type="datetimeFigureOut">
               <a:rPr lang="en-US" smtClean="0"/>
-              <a:t>10/4/22</a:t>
+              <a:t>10/5/22</a:t>
             </a:fld>
             <a:endParaRPr lang="en-US"/>
           </a:p>

</xml_diff>